<commit_message>
check menu issues fixed
</commit_message>
<xml_diff>
--- a/PPT Ohmyfood.pptx
+++ b/PPT Ohmyfood.pptx
@@ -119,6 +119,11 @@
       </a:defRPr>
     </a:lvl9pPr>
   </p:defaultTextStyle>
+  <p:extLst>
+    <p:ext uri="{EFAFB233-063F-42B5-8137-9DF3F51BA10A}">
+      <p15:sldGuideLst xmlns:p15="http://schemas.microsoft.com/office/powerpoint/2012/main"/>
+    </p:ext>
+  </p:extLst>
 </p:presentation>
 </file>
 
@@ -12465,7 +12470,7 @@
             <a:fld id="{5923F103-BC34-4FE4-A40E-EDDEECFDA5D0}" type="datetimeFigureOut">
               <a:rPr lang="en-US" dirty="0"/>
               <a:pPr/>
-              <a:t>10/3/22</a:t>
+              <a:t>10/6/22</a:t>
             </a:fld>
             <a:endParaRPr lang="en-US" dirty="0"/>
           </a:p>
@@ -13549,7 +13554,7 @@
           <a:p>
             <a:fld id="{923A1CC3-2375-41D4-9E03-427CAF2A4C1A}" type="datetimeFigureOut">
               <a:rPr lang="en-US" dirty="0"/>
-              <a:t>10/3/22</a:t>
+              <a:t>10/6/22</a:t>
             </a:fld>
             <a:endParaRPr lang="en-US" dirty="0"/>
           </a:p>
@@ -14525,7 +14530,7 @@
           <a:p>
             <a:fld id="{AFF16868-8199-4C2C-A5B1-63AEE139F88E}" type="datetimeFigureOut">
               <a:rPr lang="en-US" dirty="0"/>
-              <a:t>10/3/22</a:t>
+              <a:t>10/6/22</a:t>
             </a:fld>
             <a:endParaRPr lang="en-US" dirty="0"/>
           </a:p>
@@ -15655,7 +15660,7 @@
           <a:p>
             <a:fld id="{AAD9FF7F-6988-44CC-821B-644E70CD2F73}" type="datetimeFigureOut">
               <a:rPr lang="en-US" dirty="0"/>
-              <a:t>10/3/22</a:t>
+              <a:t>10/6/22</a:t>
             </a:fld>
             <a:endParaRPr lang="en-US" dirty="0"/>
           </a:p>
@@ -16684,7 +16689,7 @@
           <a:p>
             <a:fld id="{5C12C299-16B2-4475-990D-751901EACC14}" type="datetimeFigureOut">
               <a:rPr lang="en-US" dirty="0"/>
-              <a:t>10/3/22</a:t>
+              <a:t>10/6/22</a:t>
             </a:fld>
             <a:endParaRPr lang="en-US" dirty="0"/>
           </a:p>
@@ -17340,7 +17345,7 @@
           <a:p>
             <a:fld id="{9FE86839-B9D8-4651-8783-F325ECE74E65}" type="datetimeFigureOut">
               <a:rPr lang="en-US" dirty="0"/>
-              <a:t>10/3/22</a:t>
+              <a:t>10/6/22</a:t>
             </a:fld>
             <a:endParaRPr lang="en-US" dirty="0"/>
           </a:p>
@@ -18197,7 +18202,7 @@
           <a:p>
             <a:fld id="{FD484F64-32F6-45C5-931F-ADC1662401D0}" type="datetimeFigureOut">
               <a:rPr lang="en-US" dirty="0"/>
-              <a:t>10/3/22</a:t>
+              <a:t>10/6/22</a:t>
             </a:fld>
             <a:endParaRPr lang="en-US" dirty="0"/>
           </a:p>
@@ -18383,7 +18388,7 @@
           <a:p>
             <a:fld id="{53086D93-FCAC-47E0-A2EE-787E62CA814C}" type="datetimeFigureOut">
               <a:rPr lang="en-US" dirty="0"/>
-              <a:t>10/3/22</a:t>
+              <a:t>10/6/22</a:t>
             </a:fld>
             <a:endParaRPr lang="en-US" dirty="0"/>
           </a:p>
@@ -19351,7 +19356,7 @@
           <a:p>
             <a:fld id="{CDA879A6-0FD0-4734-A311-86BFCA472E6E}" type="datetimeFigureOut">
               <a:rPr lang="en-US" dirty="0"/>
-              <a:t>10/3/22</a:t>
+              <a:t>10/6/22</a:t>
             </a:fld>
             <a:endParaRPr lang="en-US" dirty="0"/>
           </a:p>
@@ -19558,7 +19563,7 @@
           <a:p>
             <a:fld id="{19C9CA7B-DFD4-44B5-8C60-D14B8CD1FB59}" type="datetimeFigureOut">
               <a:rPr lang="en-US" dirty="0"/>
-              <a:t>10/3/22</a:t>
+              <a:t>10/6/22</a:t>
             </a:fld>
             <a:endParaRPr lang="en-US" dirty="0"/>
           </a:p>
@@ -20588,7 +20593,7 @@
           <a:p>
             <a:fld id="{F34E6425-0181-43F2-84FC-787E803FD2F8}" type="datetimeFigureOut">
               <a:rPr lang="en-US" dirty="0"/>
-              <a:t>10/3/22</a:t>
+              <a:t>10/6/22</a:t>
             </a:fld>
             <a:endParaRPr lang="en-US" dirty="0"/>
           </a:p>
@@ -20856,7 +20861,7 @@
           <a:p>
             <a:fld id="{3BDB8791-F1B0-41E7-B7FD-A781E65C4266}" type="datetimeFigureOut">
               <a:rPr lang="en-US" dirty="0"/>
-              <a:t>10/3/22</a:t>
+              <a:t>10/6/22</a:t>
             </a:fld>
             <a:endParaRPr lang="en-US" dirty="0"/>
           </a:p>
@@ -21262,7 +21267,7 @@
           <a:p>
             <a:fld id="{5FDD63B2-E120-4ED8-B27B-C685F510A5FE}" type="datetimeFigureOut">
               <a:rPr lang="en-US" dirty="0"/>
-              <a:t>10/3/22</a:t>
+              <a:t>10/6/22</a:t>
             </a:fld>
             <a:endParaRPr lang="en-US" dirty="0"/>
           </a:p>
@@ -21385,7 +21390,7 @@
           <a:p>
             <a:fld id="{7AA18ACC-A947-437B-A130-35BD54FDF1E9}" type="datetimeFigureOut">
               <a:rPr lang="en-US" dirty="0"/>
-              <a:t>10/3/22</a:t>
+              <a:t>10/6/22</a:t>
             </a:fld>
             <a:endParaRPr lang="en-US" dirty="0"/>
           </a:p>
@@ -21476,7 +21481,7 @@
           <a:p>
             <a:fld id="{7C8D7E02-BCB8-4D50-A234-369438C08659}" type="datetimeFigureOut">
               <a:rPr lang="en-US" dirty="0"/>
-              <a:t>10/3/22</a:t>
+              <a:t>10/6/22</a:t>
             </a:fld>
             <a:endParaRPr lang="en-US" dirty="0"/>
           </a:p>
@@ -22553,7 +22558,7 @@
           <a:p>
             <a:fld id="{76E86A4C-8E40-4F87-A4F0-01A0687C5742}" type="datetimeFigureOut">
               <a:rPr lang="en-US" dirty="0"/>
-              <a:t>10/3/22</a:t>
+              <a:t>10/6/22</a:t>
             </a:fld>
             <a:endParaRPr lang="en-US" dirty="0"/>
           </a:p>
@@ -23657,7 +23662,7 @@
           <a:p>
             <a:fld id="{35E72C73-2D91-4E12-BA25-F0AA0C03599B}" type="datetimeFigureOut">
               <a:rPr lang="en-US" dirty="0"/>
-              <a:t>10/3/22</a:t>
+              <a:t>10/6/22</a:t>
             </a:fld>
             <a:endParaRPr lang="en-US" dirty="0"/>
           </a:p>
@@ -24650,7 +24655,7 @@
           <a:p>
             <a:fld id="{2BE451C3-0FF4-47C4-B829-773ADF60F88C}" type="datetimeFigureOut">
               <a:rPr lang="en-US" dirty="0"/>
-              <a:t>10/3/22</a:t>
+              <a:t>10/6/22</a:t>
             </a:fld>
             <a:endParaRPr lang="en-US" dirty="0"/>
           </a:p>
@@ -26942,8 +26947,21 @@
                   <a:schemeClr val="tx1"/>
                 </a:solidFill>
               </a:rPr>
-              <a:t>1200px to 3000px</a:t>
+              <a:t>1200px </a:t>
             </a:r>
+            <a:r>
+              <a:rPr lang="en-US" sz="5000">
+                <a:solidFill>
+                  <a:schemeClr val="tx1"/>
+                </a:solidFill>
+              </a:rPr>
+              <a:t>to 3000px</a:t>
+            </a:r>
+            <a:endParaRPr lang="en-US" sz="5000" dirty="0">
+              <a:solidFill>
+                <a:schemeClr val="tx1"/>
+              </a:solidFill>
+            </a:endParaRPr>
           </a:p>
         </p:txBody>
       </p:sp>

</xml_diff>